<commit_message>
dashboard qismini qilishga harakat qilgan edim
</commit_message>
<xml_diff>
--- a/EDUCATION.pptx
+++ b/EDUCATION.pptx
@@ -111,6 +111,11 @@
       </a:defRPr>
     </a:lvl9pPr>
   </p:defaultTextStyle>
+  <p:extLst>
+    <p:ext uri="{EFAFB233-063F-42B5-8137-9DF3F51BA10A}">
+      <p15:sldGuideLst xmlns:p15="http://schemas.microsoft.com/office/powerpoint/2012/main"/>
+    </p:ext>
+  </p:extLst>
 </p:presentation>
 </file>
 
@@ -849,7 +854,7 @@
             <a:fld id="{B61BEF0D-F0BB-DE4B-95CE-6DB70DBA9567}" type="datetimeFigureOut">
               <a:rPr lang="en-US" dirty="0"/>
               <a:pPr/>
-              <a:t>9/12/2024</a:t>
+              <a:t>9/21/2024</a:t>
             </a:fld>
             <a:endParaRPr lang="en-US" dirty="0"/>
           </a:p>
@@ -1097,7 +1102,7 @@
             <a:fld id="{B61BEF0D-F0BB-DE4B-95CE-6DB70DBA9567}" type="datetimeFigureOut">
               <a:rPr lang="en-US" dirty="0"/>
               <a:pPr/>
-              <a:t>9/12/2024</a:t>
+              <a:t>9/21/2024</a:t>
             </a:fld>
             <a:endParaRPr lang="en-US" dirty="0"/>
           </a:p>
@@ -1408,7 +1413,7 @@
             <a:fld id="{B61BEF0D-F0BB-DE4B-95CE-6DB70DBA9567}" type="datetimeFigureOut">
               <a:rPr lang="en-US" dirty="0"/>
               <a:pPr/>
-              <a:t>9/12/2024</a:t>
+              <a:t>9/21/2024</a:t>
             </a:fld>
             <a:endParaRPr lang="en-US" dirty="0"/>
           </a:p>
@@ -1746,7 +1751,7 @@
             <a:fld id="{B61BEF0D-F0BB-DE4B-95CE-6DB70DBA9567}" type="datetimeFigureOut">
               <a:rPr lang="en-US" dirty="0"/>
               <a:pPr/>
-              <a:t>9/12/2024</a:t>
+              <a:t>9/21/2024</a:t>
             </a:fld>
             <a:endParaRPr lang="en-US" dirty="0"/>
           </a:p>
@@ -2057,7 +2062,7 @@
             <a:fld id="{B61BEF0D-F0BB-DE4B-95CE-6DB70DBA9567}" type="datetimeFigureOut">
               <a:rPr lang="en-US" dirty="0"/>
               <a:pPr/>
-              <a:t>9/12/2024</a:t>
+              <a:t>9/21/2024</a:t>
             </a:fld>
             <a:endParaRPr lang="en-US" dirty="0"/>
           </a:p>
@@ -2447,7 +2452,7 @@
             <a:fld id="{B61BEF0D-F0BB-DE4B-95CE-6DB70DBA9567}" type="datetimeFigureOut">
               <a:rPr lang="en-US" dirty="0"/>
               <a:pPr/>
-              <a:t>9/12/2024</a:t>
+              <a:t>9/21/2024</a:t>
             </a:fld>
             <a:endParaRPr lang="en-US" dirty="0"/>
           </a:p>
@@ -2613,7 +2618,7 @@
           <a:p>
             <a:fld id="{55C6B4A9-1611-4792-9094-5F34BCA07E0B}" type="datetimeFigureOut">
               <a:rPr lang="en-US" dirty="0"/>
-              <a:t>9/12/2024</a:t>
+              <a:t>9/21/2024</a:t>
             </a:fld>
             <a:endParaRPr lang="en-US" dirty="0"/>
           </a:p>
@@ -2789,7 +2794,7 @@
             <a:fld id="{B61BEF0D-F0BB-DE4B-95CE-6DB70DBA9567}" type="datetimeFigureOut">
               <a:rPr lang="en-US" dirty="0"/>
               <a:pPr/>
-              <a:t>9/12/2024</a:t>
+              <a:t>9/21/2024</a:t>
             </a:fld>
             <a:endParaRPr lang="en-US" dirty="0"/>
           </a:p>
@@ -2962,7 +2967,7 @@
             <a:fld id="{B61BEF0D-F0BB-DE4B-95CE-6DB70DBA9567}" type="datetimeFigureOut">
               <a:rPr lang="en-US" dirty="0"/>
               <a:pPr/>
-              <a:t>9/12/2024</a:t>
+              <a:t>9/21/2024</a:t>
             </a:fld>
             <a:endParaRPr lang="en-US" dirty="0"/>
           </a:p>
@@ -3206,7 +3211,7 @@
             <a:fld id="{B61BEF0D-F0BB-DE4B-95CE-6DB70DBA9567}" type="datetimeFigureOut">
               <a:rPr lang="en-US" dirty="0"/>
               <a:pPr/>
-              <a:t>9/12/2024</a:t>
+              <a:t>9/21/2024</a:t>
             </a:fld>
             <a:endParaRPr lang="en-US" dirty="0"/>
           </a:p>
@@ -3434,7 +3439,7 @@
           <a:p>
             <a:fld id="{EB712588-04B1-427B-82EE-E8DB90309F08}" type="datetimeFigureOut">
               <a:rPr lang="en-US" dirty="0"/>
-              <a:t>9/12/2024</a:t>
+              <a:t>9/21/2024</a:t>
             </a:fld>
             <a:endParaRPr lang="en-US" dirty="0"/>
           </a:p>
@@ -3804,7 +3809,7 @@
             <a:fld id="{B61BEF0D-F0BB-DE4B-95CE-6DB70DBA9567}" type="datetimeFigureOut">
               <a:rPr lang="en-US" dirty="0"/>
               <a:pPr/>
-              <a:t>9/12/2024</a:t>
+              <a:t>9/21/2024</a:t>
             </a:fld>
             <a:endParaRPr lang="en-US" dirty="0"/>
           </a:p>
@@ -3924,7 +3929,7 @@
             <a:fld id="{B61BEF0D-F0BB-DE4B-95CE-6DB70DBA9567}" type="datetimeFigureOut">
               <a:rPr lang="en-US" dirty="0"/>
               <a:pPr/>
-              <a:t>9/12/2024</a:t>
+              <a:t>9/21/2024</a:t>
             </a:fld>
             <a:endParaRPr lang="en-US" dirty="0"/>
           </a:p>
@@ -4016,7 +4021,7 @@
             <a:fld id="{B61BEF0D-F0BB-DE4B-95CE-6DB70DBA9567}" type="datetimeFigureOut">
               <a:rPr lang="en-US" dirty="0"/>
               <a:pPr/>
-              <a:t>9/12/2024</a:t>
+              <a:t>9/21/2024</a:t>
             </a:fld>
             <a:endParaRPr lang="en-US" dirty="0"/>
           </a:p>
@@ -4267,7 +4272,7 @@
           <a:p>
             <a:fld id="{42A54C80-263E-416B-A8E0-580EDEADCBDC}" type="datetimeFigureOut">
               <a:rPr lang="en-US" dirty="0"/>
-              <a:t>9/12/2024</a:t>
+              <a:t>9/21/2024</a:t>
             </a:fld>
             <a:endParaRPr lang="en-US" dirty="0"/>
           </a:p>
@@ -4526,7 +4531,7 @@
             <a:fld id="{B61BEF0D-F0BB-DE4B-95CE-6DB70DBA9567}" type="datetimeFigureOut">
               <a:rPr lang="en-US" dirty="0"/>
               <a:pPr/>
-              <a:t>9/12/2024</a:t>
+              <a:t>9/21/2024</a:t>
             </a:fld>
             <a:endParaRPr lang="en-US" dirty="0"/>
           </a:p>
@@ -5266,7 +5271,7 @@
             <a:fld id="{B61BEF0D-F0BB-DE4B-95CE-6DB70DBA9567}" type="datetimeFigureOut">
               <a:rPr lang="en-US" dirty="0"/>
               <a:pPr/>
-              <a:t>9/12/2024</a:t>
+              <a:t>9/21/2024</a:t>
             </a:fld>
             <a:endParaRPr lang="en-US" dirty="0"/>
           </a:p>
@@ -5822,7 +5827,7 @@
             </a:br>
             <a:r>
               <a:rPr lang="uz-Latn-UZ" sz="8000" dirty="0"/>
-              <a:t>MATHEMATICS</a:t>
+              <a:t>MATH</a:t>
             </a:r>
             <a:endParaRPr lang="ru-RU" sz="8000" dirty="0"/>
           </a:p>

</xml_diff>